<commit_message>
First checkpoint presentation updated
</commit_message>
<xml_diff>
--- a/Checkpoint 1.pptx
+++ b/Checkpoint 1.pptx
@@ -5365,7 +5365,7 @@
           <a:p>
             <a:r>
               <a:rPr lang="pt-PT" dirty="0"/>
-              <a:t>Estrutura de autorização que permite que os aplicativos obtenham acesso limitado às contas de usuários em um serviço HTTP.</a:t>
+              <a:t>Estrutura de autorização que permite que as aplicações obtenham acesso limitado às contas de usuários em um serviço HTTP.</a:t>
             </a:r>
           </a:p>
           <a:p>
@@ -5870,7 +5870,12 @@
             <p:ph type="title"/>
           </p:nvPr>
         </p:nvSpPr>
-        <p:spPr/>
+        <p:spPr>
+          <a:xfrm>
+            <a:off x="457200" y="277815"/>
+            <a:ext cx="8229600" cy="1139825"/>
+          </a:xfrm>
+        </p:spPr>
         <p:txBody>
           <a:bodyPr/>
           <a:lstStyle/>
@@ -5891,25 +5896,784 @@
           </a:p>
         </p:txBody>
       </p:sp>
-      <p:sp>
-        <p:nvSpPr>
-          <p:cNvPr id="18435" name="Rectangle 3"/>
-          <p:cNvSpPr>
-            <a:spLocks noGrp="1" noChangeArrowheads="1"/>
-          </p:cNvSpPr>
-          <p:nvPr>
-            <p:ph type="body" idx="1"/>
-          </p:nvPr>
-        </p:nvSpPr>
-        <p:spPr/>
-        <p:txBody>
-          <a:bodyPr/>
-          <a:lstStyle/>
-          <a:p>
-            <a:endParaRPr lang="pt-PT" dirty="0"/>
-          </a:p>
-        </p:txBody>
-      </p:sp>
+      <p:pic>
+        <p:nvPicPr>
+          <p:cNvPr id="2" name="Imagem 1">
+            <a:extLst>
+              <a:ext uri="{FF2B5EF4-FFF2-40B4-BE49-F238E27FC236}">
+                <a16:creationId xmlns:a16="http://schemas.microsoft.com/office/drawing/2014/main" id="{5DB6A7EF-8D65-4C2B-B177-160ADE73084F}"/>
+              </a:ext>
+            </a:extLst>
+          </p:cNvPr>
+          <p:cNvPicPr>
+            <a:picLocks noChangeAspect="1"/>
+          </p:cNvPicPr>
+          <p:nvPr/>
+        </p:nvPicPr>
+        <p:blipFill rotWithShape="1">
+          <a:blip r:embed="rId2"/>
+          <a:srcRect t="17609" b="13478"/>
+          <a:stretch/>
+        </p:blipFill>
+        <p:spPr>
+          <a:xfrm>
+            <a:off x="1156191" y="3573016"/>
+            <a:ext cx="2119665" cy="736298"/>
+          </a:xfrm>
+          <a:prstGeom prst="rect">
+            <a:avLst/>
+          </a:prstGeom>
+        </p:spPr>
+      </p:pic>
+      <p:pic>
+        <p:nvPicPr>
+          <p:cNvPr id="3" name="Imagem 2">
+            <a:extLst>
+              <a:ext uri="{FF2B5EF4-FFF2-40B4-BE49-F238E27FC236}">
+                <a16:creationId xmlns:a16="http://schemas.microsoft.com/office/drawing/2014/main" id="{640D5734-4CB1-4725-B470-7602841E5310}"/>
+              </a:ext>
+            </a:extLst>
+          </p:cNvPr>
+          <p:cNvPicPr>
+            <a:picLocks noChangeAspect="1"/>
+          </p:cNvPicPr>
+          <p:nvPr/>
+        </p:nvPicPr>
+        <p:blipFill>
+          <a:blip r:embed="rId3"/>
+          <a:stretch>
+            <a:fillRect/>
+          </a:stretch>
+        </p:blipFill>
+        <p:spPr>
+          <a:xfrm>
+            <a:off x="1111999" y="2342532"/>
+            <a:ext cx="2157156" cy="640035"/>
+          </a:xfrm>
+          <a:prstGeom prst="rect">
+            <a:avLst/>
+          </a:prstGeom>
+        </p:spPr>
+      </p:pic>
+      <p:pic>
+        <p:nvPicPr>
+          <p:cNvPr id="4" name="Imagem 3">
+            <a:extLst>
+              <a:ext uri="{FF2B5EF4-FFF2-40B4-BE49-F238E27FC236}">
+                <a16:creationId xmlns:a16="http://schemas.microsoft.com/office/drawing/2014/main" id="{D034C6FD-9587-44BC-9282-30EC01D88988}"/>
+              </a:ext>
+            </a:extLst>
+          </p:cNvPr>
+          <p:cNvPicPr>
+            <a:picLocks noChangeAspect="1"/>
+          </p:cNvPicPr>
+          <p:nvPr/>
+        </p:nvPicPr>
+        <p:blipFill>
+          <a:blip r:embed="rId4"/>
+          <a:stretch>
+            <a:fillRect/>
+          </a:stretch>
+        </p:blipFill>
+        <p:spPr>
+          <a:xfrm>
+            <a:off x="1092783" y="4610332"/>
+            <a:ext cx="2327089" cy="1617611"/>
+          </a:xfrm>
+          <a:prstGeom prst="rect">
+            <a:avLst/>
+          </a:prstGeom>
+        </p:spPr>
+      </p:pic>
+      <p:pic>
+        <p:nvPicPr>
+          <p:cNvPr id="5" name="Imagem 4">
+            <a:extLst>
+              <a:ext uri="{FF2B5EF4-FFF2-40B4-BE49-F238E27FC236}">
+                <a16:creationId xmlns:a16="http://schemas.microsoft.com/office/drawing/2014/main" id="{83DEBAD1-2A2B-497B-89BB-CD4DA2252615}"/>
+              </a:ext>
+            </a:extLst>
+          </p:cNvPr>
+          <p:cNvPicPr>
+            <a:picLocks noChangeAspect="1"/>
+          </p:cNvPicPr>
+          <p:nvPr/>
+        </p:nvPicPr>
+        <p:blipFill>
+          <a:blip r:embed="rId5"/>
+          <a:stretch>
+            <a:fillRect/>
+          </a:stretch>
+        </p:blipFill>
+        <p:spPr>
+          <a:xfrm>
+            <a:off x="4294374" y="2825816"/>
+            <a:ext cx="1101868" cy="2247809"/>
+          </a:xfrm>
+          <a:prstGeom prst="rect">
+            <a:avLst/>
+          </a:prstGeom>
+        </p:spPr>
+      </p:pic>
+      <p:pic>
+        <p:nvPicPr>
+          <p:cNvPr id="8" name="Picture 2" descr="Resultado de imagem para facebook">
+            <a:extLst>
+              <a:ext uri="{FF2B5EF4-FFF2-40B4-BE49-F238E27FC236}">
+                <a16:creationId xmlns:a16="http://schemas.microsoft.com/office/drawing/2014/main" id="{CA5A4716-EEA2-47A3-B526-31B21156DA64}"/>
+              </a:ext>
+            </a:extLst>
+          </p:cNvPr>
+          <p:cNvPicPr>
+            <a:picLocks noChangeAspect="1" noChangeArrowheads="1"/>
+          </p:cNvPicPr>
+          <p:nvPr/>
+        </p:nvPicPr>
+        <p:blipFill>
+          <a:blip r:embed="rId6" cstate="print">
+            <a:extLst>
+              <a:ext uri="{28A0092B-C50C-407E-A947-70E740481C1C}">
+                <a14:useLocalDpi xmlns:a14="http://schemas.microsoft.com/office/drawing/2010/main" val="0"/>
+              </a:ext>
+            </a:extLst>
+          </a:blip>
+          <a:srcRect/>
+          <a:stretch>
+            <a:fillRect/>
+          </a:stretch>
+        </p:blipFill>
+        <p:spPr bwMode="auto">
+          <a:xfrm>
+            <a:off x="6707319" y="1851704"/>
+            <a:ext cx="799961" cy="799961"/>
+          </a:xfrm>
+          <a:prstGeom prst="rect">
+            <a:avLst/>
+          </a:prstGeom>
+          <a:noFill/>
+          <a:extLst>
+            <a:ext uri="{909E8E84-426E-40DD-AFC4-6F175D3DCCD1}">
+              <a14:hiddenFill xmlns:a14="http://schemas.microsoft.com/office/drawing/2010/main">
+                <a:solidFill>
+                  <a:srgbClr val="FFFFFF"/>
+                </a:solidFill>
+              </a14:hiddenFill>
+            </a:ext>
+          </a:extLst>
+        </p:spPr>
+      </p:pic>
+      <p:pic>
+        <p:nvPicPr>
+          <p:cNvPr id="9" name="Picture 4" descr="Resultado de imagem para github">
+            <a:extLst>
+              <a:ext uri="{FF2B5EF4-FFF2-40B4-BE49-F238E27FC236}">
+                <a16:creationId xmlns:a16="http://schemas.microsoft.com/office/drawing/2014/main" id="{637EA6D4-372E-48B2-8052-59B517C62A84}"/>
+              </a:ext>
+            </a:extLst>
+          </p:cNvPr>
+          <p:cNvPicPr>
+            <a:picLocks noChangeAspect="1" noChangeArrowheads="1"/>
+          </p:cNvPicPr>
+          <p:nvPr/>
+        </p:nvPicPr>
+        <p:blipFill>
+          <a:blip r:embed="rId7" cstate="print">
+            <a:extLst>
+              <a:ext uri="{28A0092B-C50C-407E-A947-70E740481C1C}">
+                <a14:useLocalDpi xmlns:a14="http://schemas.microsoft.com/office/drawing/2010/main" val="0"/>
+              </a:ext>
+            </a:extLst>
+          </a:blip>
+          <a:srcRect/>
+          <a:stretch>
+            <a:fillRect/>
+          </a:stretch>
+        </p:blipFill>
+        <p:spPr bwMode="auto">
+          <a:xfrm>
+            <a:off x="6228184" y="5180398"/>
+            <a:ext cx="1948883" cy="1023164"/>
+          </a:xfrm>
+          <a:prstGeom prst="rect">
+            <a:avLst/>
+          </a:prstGeom>
+          <a:noFill/>
+          <a:extLst>
+            <a:ext uri="{909E8E84-426E-40DD-AFC4-6F175D3DCCD1}">
+              <a14:hiddenFill xmlns:a14="http://schemas.microsoft.com/office/drawing/2010/main">
+                <a:solidFill>
+                  <a:srgbClr val="FFFFFF"/>
+                </a:solidFill>
+              </a14:hiddenFill>
+            </a:ext>
+          </a:extLst>
+        </p:spPr>
+      </p:pic>
+      <p:pic>
+        <p:nvPicPr>
+          <p:cNvPr id="10" name="Picture 6" descr="Resultado de imagem para google">
+            <a:extLst>
+              <a:ext uri="{FF2B5EF4-FFF2-40B4-BE49-F238E27FC236}">
+                <a16:creationId xmlns:a16="http://schemas.microsoft.com/office/drawing/2014/main" id="{F48585E8-EB9E-45B0-B494-0106D3EA61A2}"/>
+              </a:ext>
+            </a:extLst>
+          </p:cNvPr>
+          <p:cNvPicPr>
+            <a:picLocks noChangeAspect="1" noChangeArrowheads="1"/>
+          </p:cNvPicPr>
+          <p:nvPr/>
+        </p:nvPicPr>
+        <p:blipFill>
+          <a:blip r:embed="rId8" cstate="print">
+            <a:extLst>
+              <a:ext uri="{28A0092B-C50C-407E-A947-70E740481C1C}">
+                <a14:useLocalDpi xmlns:a14="http://schemas.microsoft.com/office/drawing/2010/main" val="0"/>
+              </a:ext>
+            </a:extLst>
+          </a:blip>
+          <a:srcRect/>
+          <a:stretch>
+            <a:fillRect/>
+          </a:stretch>
+        </p:blipFill>
+        <p:spPr bwMode="auto">
+          <a:xfrm>
+            <a:off x="6684641" y="4085488"/>
+            <a:ext cx="939120" cy="939120"/>
+          </a:xfrm>
+          <a:prstGeom prst="rect">
+            <a:avLst/>
+          </a:prstGeom>
+          <a:noFill/>
+          <a:extLst>
+            <a:ext uri="{909E8E84-426E-40DD-AFC4-6F175D3DCCD1}">
+              <a14:hiddenFill xmlns:a14="http://schemas.microsoft.com/office/drawing/2010/main">
+                <a:solidFill>
+                  <a:srgbClr val="FFFFFF"/>
+                </a:solidFill>
+              </a14:hiddenFill>
+            </a:ext>
+          </a:extLst>
+        </p:spPr>
+      </p:pic>
+      <p:pic>
+        <p:nvPicPr>
+          <p:cNvPr id="11" name="Picture 8" descr="Resultado de imagem para twitter">
+            <a:extLst>
+              <a:ext uri="{FF2B5EF4-FFF2-40B4-BE49-F238E27FC236}">
+                <a16:creationId xmlns:a16="http://schemas.microsoft.com/office/drawing/2014/main" id="{7566F0BF-72DD-4F91-84A7-8BAE6DF83D6C}"/>
+              </a:ext>
+            </a:extLst>
+          </p:cNvPr>
+          <p:cNvPicPr>
+            <a:picLocks noChangeAspect="1" noChangeArrowheads="1"/>
+          </p:cNvPicPr>
+          <p:nvPr/>
+        </p:nvPicPr>
+        <p:blipFill>
+          <a:blip r:embed="rId9" cstate="print">
+            <a:extLst>
+              <a:ext uri="{28A0092B-C50C-407E-A947-70E740481C1C}">
+                <a14:useLocalDpi xmlns:a14="http://schemas.microsoft.com/office/drawing/2010/main" val="0"/>
+              </a:ext>
+            </a:extLst>
+          </a:blip>
+          <a:srcRect/>
+          <a:stretch>
+            <a:fillRect/>
+          </a:stretch>
+        </p:blipFill>
+        <p:spPr bwMode="auto">
+          <a:xfrm>
+            <a:off x="6603267" y="2963157"/>
+            <a:ext cx="1101868" cy="890731"/>
+          </a:xfrm>
+          <a:prstGeom prst="rect">
+            <a:avLst/>
+          </a:prstGeom>
+          <a:noFill/>
+          <a:extLst>
+            <a:ext uri="{909E8E84-426E-40DD-AFC4-6F175D3DCCD1}">
+              <a14:hiddenFill xmlns:a14="http://schemas.microsoft.com/office/drawing/2010/main">
+                <a:solidFill>
+                  <a:srgbClr val="FFFFFF"/>
+                </a:solidFill>
+              </a14:hiddenFill>
+            </a:ext>
+          </a:extLst>
+        </p:spPr>
+      </p:pic>
+      <p:cxnSp>
+        <p:nvCxnSpPr>
+          <p:cNvPr id="7" name="Conexão reta unidirecional 6">
+            <a:extLst>
+              <a:ext uri="{FF2B5EF4-FFF2-40B4-BE49-F238E27FC236}">
+                <a16:creationId xmlns:a16="http://schemas.microsoft.com/office/drawing/2014/main" id="{D954E17F-ED34-4470-81F0-8E183A9A9117}"/>
+              </a:ext>
+            </a:extLst>
+          </p:cNvPr>
+          <p:cNvCxnSpPr>
+            <a:cxnSpLocks/>
+          </p:cNvCxnSpPr>
+          <p:nvPr/>
+        </p:nvCxnSpPr>
+        <p:spPr bwMode="auto">
+          <a:xfrm>
+            <a:off x="3439834" y="2780928"/>
+            <a:ext cx="750680" cy="880612"/>
+          </a:xfrm>
+          <a:prstGeom prst="straightConnector1">
+            <a:avLst/>
+          </a:prstGeom>
+          <a:ln>
+            <a:headEnd type="triangle"/>
+            <a:tailEnd type="triangle"/>
+          </a:ln>
+          <a:extLst>
+            <a:ext uri="{AF507438-7753-43E0-B8FC-AC1667EBCBE1}">
+              <a14:hiddenEffects xmlns:a14="http://schemas.microsoft.com/office/drawing/2010/main">
+                <a:effectLst>
+                  <a:outerShdw dist="35921" dir="2700000" algn="ctr" rotWithShape="0">
+                    <a:schemeClr val="bg2"/>
+                  </a:outerShdw>
+                </a:effectLst>
+              </a14:hiddenEffects>
+            </a:ext>
+          </a:extLst>
+        </p:spPr>
+        <p:style>
+          <a:lnRef idx="2">
+            <a:schemeClr val="dk1"/>
+          </a:lnRef>
+          <a:fillRef idx="0">
+            <a:schemeClr val="dk1"/>
+          </a:fillRef>
+          <a:effectRef idx="1">
+            <a:schemeClr val="dk1"/>
+          </a:effectRef>
+          <a:fontRef idx="minor">
+            <a:schemeClr val="tx1"/>
+          </a:fontRef>
+        </p:style>
+      </p:cxnSp>
+      <p:cxnSp>
+        <p:nvCxnSpPr>
+          <p:cNvPr id="14" name="Conexão reta unidirecional 13">
+            <a:extLst>
+              <a:ext uri="{FF2B5EF4-FFF2-40B4-BE49-F238E27FC236}">
+                <a16:creationId xmlns:a16="http://schemas.microsoft.com/office/drawing/2014/main" id="{741F5E59-2AC0-4EAD-BF32-EFD8BF79B75F}"/>
+              </a:ext>
+            </a:extLst>
+          </p:cNvPr>
+          <p:cNvCxnSpPr>
+            <a:cxnSpLocks/>
+          </p:cNvCxnSpPr>
+          <p:nvPr/>
+        </p:nvCxnSpPr>
+        <p:spPr bwMode="auto">
+          <a:xfrm>
+            <a:off x="3379949" y="3949721"/>
+            <a:ext cx="816449" cy="0"/>
+          </a:xfrm>
+          <a:prstGeom prst="straightConnector1">
+            <a:avLst/>
+          </a:prstGeom>
+          <a:ln>
+            <a:headEnd type="triangle"/>
+            <a:tailEnd type="triangle"/>
+          </a:ln>
+          <a:extLst>
+            <a:ext uri="{AF507438-7753-43E0-B8FC-AC1667EBCBE1}">
+              <a14:hiddenEffects xmlns:a14="http://schemas.microsoft.com/office/drawing/2010/main">
+                <a:effectLst>
+                  <a:outerShdw dist="35921" dir="2700000" algn="ctr" rotWithShape="0">
+                    <a:schemeClr val="bg2"/>
+                  </a:outerShdw>
+                </a:effectLst>
+              </a14:hiddenEffects>
+            </a:ext>
+          </a:extLst>
+        </p:spPr>
+        <p:style>
+          <a:lnRef idx="2">
+            <a:schemeClr val="dk1"/>
+          </a:lnRef>
+          <a:fillRef idx="0">
+            <a:schemeClr val="dk1"/>
+          </a:fillRef>
+          <a:effectRef idx="1">
+            <a:schemeClr val="dk1"/>
+          </a:effectRef>
+          <a:fontRef idx="minor">
+            <a:schemeClr val="tx1"/>
+          </a:fontRef>
+        </p:style>
+      </p:cxnSp>
+      <p:cxnSp>
+        <p:nvCxnSpPr>
+          <p:cNvPr id="17" name="Conexão reta unidirecional 16">
+            <a:extLst>
+              <a:ext uri="{FF2B5EF4-FFF2-40B4-BE49-F238E27FC236}">
+                <a16:creationId xmlns:a16="http://schemas.microsoft.com/office/drawing/2014/main" id="{84C7E4B9-3C6F-428F-B17C-FCE615945012}"/>
+              </a:ext>
+            </a:extLst>
+          </p:cNvPr>
+          <p:cNvCxnSpPr>
+            <a:cxnSpLocks/>
+          </p:cNvCxnSpPr>
+          <p:nvPr/>
+        </p:nvCxnSpPr>
+        <p:spPr bwMode="auto">
+          <a:xfrm flipV="1">
+            <a:off x="3484702" y="4472391"/>
+            <a:ext cx="642318" cy="756809"/>
+          </a:xfrm>
+          <a:prstGeom prst="straightConnector1">
+            <a:avLst/>
+          </a:prstGeom>
+          <a:ln>
+            <a:headEnd type="triangle"/>
+            <a:tailEnd type="triangle"/>
+          </a:ln>
+          <a:extLst>
+            <a:ext uri="{AF507438-7753-43E0-B8FC-AC1667EBCBE1}">
+              <a14:hiddenEffects xmlns:a14="http://schemas.microsoft.com/office/drawing/2010/main">
+                <a:effectLst>
+                  <a:outerShdw dist="35921" dir="2700000" algn="ctr" rotWithShape="0">
+                    <a:schemeClr val="bg2"/>
+                  </a:outerShdw>
+                </a:effectLst>
+              </a14:hiddenEffects>
+            </a:ext>
+          </a:extLst>
+        </p:spPr>
+        <p:style>
+          <a:lnRef idx="2">
+            <a:schemeClr val="dk1"/>
+          </a:lnRef>
+          <a:fillRef idx="0">
+            <a:schemeClr val="dk1"/>
+          </a:fillRef>
+          <a:effectRef idx="1">
+            <a:schemeClr val="dk1"/>
+          </a:effectRef>
+          <a:fontRef idx="minor">
+            <a:schemeClr val="tx1"/>
+          </a:fontRef>
+        </p:style>
+      </p:cxnSp>
+      <p:cxnSp>
+        <p:nvCxnSpPr>
+          <p:cNvPr id="23" name="Conexão reta unidirecional 22">
+            <a:extLst>
+              <a:ext uri="{FF2B5EF4-FFF2-40B4-BE49-F238E27FC236}">
+                <a16:creationId xmlns:a16="http://schemas.microsoft.com/office/drawing/2014/main" id="{A15645E1-1885-4E39-9330-D2BF9BF3C7E1}"/>
+              </a:ext>
+            </a:extLst>
+          </p:cNvPr>
+          <p:cNvCxnSpPr>
+            <a:cxnSpLocks/>
+          </p:cNvCxnSpPr>
+          <p:nvPr/>
+        </p:nvCxnSpPr>
+        <p:spPr bwMode="auto">
+          <a:xfrm flipV="1">
+            <a:off x="5540932" y="2471354"/>
+            <a:ext cx="759260" cy="1157453"/>
+          </a:xfrm>
+          <a:prstGeom prst="straightConnector1">
+            <a:avLst/>
+          </a:prstGeom>
+          <a:ln>
+            <a:headEnd type="triangle"/>
+            <a:tailEnd type="triangle"/>
+          </a:ln>
+          <a:extLst>
+            <a:ext uri="{AF507438-7753-43E0-B8FC-AC1667EBCBE1}">
+              <a14:hiddenEffects xmlns:a14="http://schemas.microsoft.com/office/drawing/2010/main">
+                <a:effectLst>
+                  <a:outerShdw dist="35921" dir="2700000" algn="ctr" rotWithShape="0">
+                    <a:schemeClr val="bg2"/>
+                  </a:outerShdw>
+                </a:effectLst>
+              </a14:hiddenEffects>
+            </a:ext>
+          </a:extLst>
+        </p:spPr>
+        <p:style>
+          <a:lnRef idx="2">
+            <a:schemeClr val="dk1"/>
+          </a:lnRef>
+          <a:fillRef idx="0">
+            <a:schemeClr val="dk1"/>
+          </a:fillRef>
+          <a:effectRef idx="1">
+            <a:schemeClr val="dk1"/>
+          </a:effectRef>
+          <a:fontRef idx="minor">
+            <a:schemeClr val="tx1"/>
+          </a:fontRef>
+        </p:style>
+      </p:cxnSp>
+      <p:cxnSp>
+        <p:nvCxnSpPr>
+          <p:cNvPr id="27" name="Conexão reta unidirecional 26">
+            <a:extLst>
+              <a:ext uri="{FF2B5EF4-FFF2-40B4-BE49-F238E27FC236}">
+                <a16:creationId xmlns:a16="http://schemas.microsoft.com/office/drawing/2014/main" id="{C8A6057C-565F-4FC2-8F9E-47465547E29B}"/>
+              </a:ext>
+            </a:extLst>
+          </p:cNvPr>
+          <p:cNvCxnSpPr>
+            <a:cxnSpLocks/>
+          </p:cNvCxnSpPr>
+          <p:nvPr/>
+        </p:nvCxnSpPr>
+        <p:spPr bwMode="auto">
+          <a:xfrm flipV="1">
+            <a:off x="5558838" y="3526916"/>
+            <a:ext cx="741354" cy="417058"/>
+          </a:xfrm>
+          <a:prstGeom prst="straightConnector1">
+            <a:avLst/>
+          </a:prstGeom>
+          <a:ln>
+            <a:headEnd type="triangle"/>
+            <a:tailEnd type="triangle"/>
+          </a:ln>
+          <a:extLst>
+            <a:ext uri="{AF507438-7753-43E0-B8FC-AC1667EBCBE1}">
+              <a14:hiddenEffects xmlns:a14="http://schemas.microsoft.com/office/drawing/2010/main">
+                <a:effectLst>
+                  <a:outerShdw dist="35921" dir="2700000" algn="ctr" rotWithShape="0">
+                    <a:schemeClr val="bg2"/>
+                  </a:outerShdw>
+                </a:effectLst>
+              </a14:hiddenEffects>
+            </a:ext>
+          </a:extLst>
+        </p:spPr>
+        <p:style>
+          <a:lnRef idx="2">
+            <a:schemeClr val="dk1"/>
+          </a:lnRef>
+          <a:fillRef idx="0">
+            <a:schemeClr val="dk1"/>
+          </a:fillRef>
+          <a:effectRef idx="1">
+            <a:schemeClr val="dk1"/>
+          </a:effectRef>
+          <a:fontRef idx="minor">
+            <a:schemeClr val="tx1"/>
+          </a:fontRef>
+        </p:style>
+      </p:cxnSp>
+      <p:cxnSp>
+        <p:nvCxnSpPr>
+          <p:cNvPr id="29" name="Conexão reta unidirecional 28">
+            <a:extLst>
+              <a:ext uri="{FF2B5EF4-FFF2-40B4-BE49-F238E27FC236}">
+                <a16:creationId xmlns:a16="http://schemas.microsoft.com/office/drawing/2014/main" id="{6CA06BF6-F6E9-48DF-84FE-574DC4B7AB87}"/>
+              </a:ext>
+            </a:extLst>
+          </p:cNvPr>
+          <p:cNvCxnSpPr>
+            <a:cxnSpLocks/>
+          </p:cNvCxnSpPr>
+          <p:nvPr/>
+        </p:nvCxnSpPr>
+        <p:spPr bwMode="auto">
+          <a:xfrm>
+            <a:off x="5591830" y="4428794"/>
+            <a:ext cx="780370" cy="990343"/>
+          </a:xfrm>
+          <a:prstGeom prst="straightConnector1">
+            <a:avLst/>
+          </a:prstGeom>
+          <a:ln>
+            <a:headEnd type="triangle"/>
+            <a:tailEnd type="triangle"/>
+          </a:ln>
+          <a:extLst>
+            <a:ext uri="{AF507438-7753-43E0-B8FC-AC1667EBCBE1}">
+              <a14:hiddenEffects xmlns:a14="http://schemas.microsoft.com/office/drawing/2010/main">
+                <a:effectLst>
+                  <a:outerShdw dist="35921" dir="2700000" algn="ctr" rotWithShape="0">
+                    <a:schemeClr val="bg2"/>
+                  </a:outerShdw>
+                </a:effectLst>
+              </a14:hiddenEffects>
+            </a:ext>
+          </a:extLst>
+        </p:spPr>
+        <p:style>
+          <a:lnRef idx="2">
+            <a:schemeClr val="dk1"/>
+          </a:lnRef>
+          <a:fillRef idx="0">
+            <a:schemeClr val="dk1"/>
+          </a:fillRef>
+          <a:effectRef idx="1">
+            <a:schemeClr val="dk1"/>
+          </a:effectRef>
+          <a:fontRef idx="minor">
+            <a:schemeClr val="tx1"/>
+          </a:fontRef>
+        </p:style>
+      </p:cxnSp>
+      <p:cxnSp>
+        <p:nvCxnSpPr>
+          <p:cNvPr id="32" name="Conexão reta unidirecional 31">
+            <a:extLst>
+              <a:ext uri="{FF2B5EF4-FFF2-40B4-BE49-F238E27FC236}">
+                <a16:creationId xmlns:a16="http://schemas.microsoft.com/office/drawing/2014/main" id="{17A6C99A-7712-4A28-9D0C-C20A6816B2DD}"/>
+              </a:ext>
+            </a:extLst>
+          </p:cNvPr>
+          <p:cNvCxnSpPr>
+            <a:cxnSpLocks/>
+          </p:cNvCxnSpPr>
+          <p:nvPr/>
+        </p:nvCxnSpPr>
+        <p:spPr bwMode="auto">
+          <a:xfrm>
+            <a:off x="5560092" y="4221088"/>
+            <a:ext cx="812108" cy="288029"/>
+          </a:xfrm>
+          <a:prstGeom prst="straightConnector1">
+            <a:avLst/>
+          </a:prstGeom>
+          <a:ln>
+            <a:headEnd type="triangle"/>
+            <a:tailEnd type="triangle"/>
+          </a:ln>
+          <a:extLst>
+            <a:ext uri="{AF507438-7753-43E0-B8FC-AC1667EBCBE1}">
+              <a14:hiddenEffects xmlns:a14="http://schemas.microsoft.com/office/drawing/2010/main">
+                <a:effectLst>
+                  <a:outerShdw dist="35921" dir="2700000" algn="ctr" rotWithShape="0">
+                    <a:schemeClr val="bg2"/>
+                  </a:outerShdw>
+                </a:effectLst>
+              </a14:hiddenEffects>
+            </a:ext>
+          </a:extLst>
+        </p:spPr>
+        <p:style>
+          <a:lnRef idx="2">
+            <a:schemeClr val="dk1"/>
+          </a:lnRef>
+          <a:fillRef idx="0">
+            <a:schemeClr val="dk1"/>
+          </a:fillRef>
+          <a:effectRef idx="1">
+            <a:schemeClr val="dk1"/>
+          </a:effectRef>
+          <a:fontRef idx="minor">
+            <a:schemeClr val="tx1"/>
+          </a:fontRef>
+        </p:style>
+      </p:cxnSp>
+      <p:cxnSp>
+        <p:nvCxnSpPr>
+          <p:cNvPr id="47" name="Conexão reta unidirecional 46">
+            <a:extLst>
+              <a:ext uri="{FF2B5EF4-FFF2-40B4-BE49-F238E27FC236}">
+                <a16:creationId xmlns:a16="http://schemas.microsoft.com/office/drawing/2014/main" id="{31B9F131-13D0-474A-9B04-D6A5FFDC0EEC}"/>
+              </a:ext>
+            </a:extLst>
+          </p:cNvPr>
+          <p:cNvCxnSpPr>
+            <a:cxnSpLocks/>
+          </p:cNvCxnSpPr>
+          <p:nvPr/>
+        </p:nvCxnSpPr>
+        <p:spPr bwMode="auto">
+          <a:xfrm flipV="1">
+            <a:off x="4863442" y="5180398"/>
+            <a:ext cx="0" cy="511582"/>
+          </a:xfrm>
+          <a:prstGeom prst="straightConnector1">
+            <a:avLst/>
+          </a:prstGeom>
+          <a:ln>
+            <a:headEnd type="triangle"/>
+            <a:tailEnd type="triangle"/>
+          </a:ln>
+          <a:extLst>
+            <a:ext uri="{AF507438-7753-43E0-B8FC-AC1667EBCBE1}">
+              <a14:hiddenEffects xmlns:a14="http://schemas.microsoft.com/office/drawing/2010/main">
+                <a:effectLst>
+                  <a:outerShdw dist="35921" dir="2700000" algn="ctr" rotWithShape="0">
+                    <a:schemeClr val="bg2"/>
+                  </a:outerShdw>
+                </a:effectLst>
+              </a14:hiddenEffects>
+            </a:ext>
+          </a:extLst>
+        </p:spPr>
+        <p:style>
+          <a:lnRef idx="2">
+            <a:schemeClr val="dk1"/>
+          </a:lnRef>
+          <a:fillRef idx="0">
+            <a:schemeClr val="dk1"/>
+          </a:fillRef>
+          <a:effectRef idx="1">
+            <a:schemeClr val="dk1"/>
+          </a:effectRef>
+          <a:fontRef idx="minor">
+            <a:schemeClr val="tx1"/>
+          </a:fontRef>
+        </p:style>
+      </p:cxnSp>
+      <p:pic>
+        <p:nvPicPr>
+          <p:cNvPr id="1026" name="Picture 2" descr="Resultado de imagem para mongodb">
+            <a:extLst>
+              <a:ext uri="{FF2B5EF4-FFF2-40B4-BE49-F238E27FC236}">
+                <a16:creationId xmlns:a16="http://schemas.microsoft.com/office/drawing/2014/main" id="{7B4AD147-12C9-4D50-A945-DB8479568180}"/>
+              </a:ext>
+            </a:extLst>
+          </p:cNvPr>
+          <p:cNvPicPr>
+            <a:picLocks noChangeAspect="1" noChangeArrowheads="1"/>
+          </p:cNvPicPr>
+          <p:nvPr/>
+        </p:nvPicPr>
+        <p:blipFill>
+          <a:blip r:embed="rId10" cstate="print">
+            <a:extLst>
+              <a:ext uri="{28A0092B-C50C-407E-A947-70E740481C1C}">
+                <a14:useLocalDpi xmlns:a14="http://schemas.microsoft.com/office/drawing/2010/main" val="0"/>
+              </a:ext>
+            </a:extLst>
+          </a:blip>
+          <a:srcRect/>
+          <a:stretch>
+            <a:fillRect/>
+          </a:stretch>
+        </p:blipFill>
+        <p:spPr bwMode="auto">
+          <a:xfrm>
+            <a:off x="4490643" y="5798753"/>
+            <a:ext cx="781432" cy="781432"/>
+          </a:xfrm>
+          <a:prstGeom prst="rect">
+            <a:avLst/>
+          </a:prstGeom>
+          <a:noFill/>
+          <a:extLst>
+            <a:ext uri="{909E8E84-426E-40DD-AFC4-6F175D3DCCD1}">
+              <a14:hiddenFill xmlns:a14="http://schemas.microsoft.com/office/drawing/2010/main">
+                <a:solidFill>
+                  <a:srgbClr val="FFFFFF"/>
+                </a:solidFill>
+              </a14:hiddenFill>
+            </a:ext>
+          </a:extLst>
+        </p:spPr>
+      </p:pic>
     </p:spTree>
     <p:extLst>
       <p:ext uri="{BB962C8B-B14F-4D97-AF65-F5344CB8AC3E}">

</xml_diff>